<commit_message>
Corrección del diagrama del patrón Composite
</commit_message>
<xml_diff>
--- a/docs/Implementacion de patrones.pptx
+++ b/docs/Implementacion de patrones.pptx
@@ -5,7 +5,7 @@
     <p:sldMasterId id="2147483648" r:id="rId1"/>
   </p:sldMasterIdLst>
   <p:handoutMasterIdLst>
-    <p:handoutMasterId r:id="rId13"/>
+    <p:handoutMasterId r:id="rId14"/>
   </p:handoutMasterIdLst>
   <p:sldIdLst>
     <p:sldId id="256" r:id="rId2"/>
@@ -19,6 +19,7 @@
     <p:sldId id="268" r:id="rId10"/>
     <p:sldId id="270" r:id="rId11"/>
     <p:sldId id="271" r:id="rId12"/>
+    <p:sldId id="272" r:id="rId13"/>
   </p:sldIdLst>
   <p:sldSz cx="12192000" cy="6858000"/>
   <p:notesSz cx="6858000" cy="9144000"/>
@@ -2041,10 +2042,10 @@
       </p:sp>
       <p:pic>
         <p:nvPicPr>
-          <p:cNvPr id="4" name="Imagen 3">
+          <p:cNvPr id="5" name="Imagen 4">
             <a:extLst>
               <a:ext uri="{FF2B5EF4-FFF2-40B4-BE49-F238E27FC236}">
-                <a16:creationId xmlns:a16="http://schemas.microsoft.com/office/drawing/2014/main" id="{B89F87F6-C0D4-488B-B32D-193074F6F150}"/>
+                <a16:creationId xmlns:a16="http://schemas.microsoft.com/office/drawing/2014/main" id="{B6419724-1A65-4559-8CC0-A092DFA54C08}"/>
               </a:ext>
             </a:extLst>
           </p:cNvPr>
@@ -2061,8 +2062,8 @@
         </p:blipFill>
         <p:spPr>
           <a:xfrm>
-            <a:off x="4382451" y="1418528"/>
-            <a:ext cx="7523799" cy="4799392"/>
+            <a:off x="3894898" y="1284287"/>
+            <a:ext cx="7077902" cy="5069986"/>
           </a:xfrm>
           <a:prstGeom prst="rect">
             <a:avLst/>
@@ -2073,6 +2074,70 @@
     <p:extLst>
       <p:ext uri="{BB962C8B-B14F-4D97-AF65-F5344CB8AC3E}">
         <p14:creationId xmlns:p14="http://schemas.microsoft.com/office/powerpoint/2010/main" val="3938917623"/>
+      </p:ext>
+    </p:extLst>
+  </p:cSld>
+  <p:clrMapOvr>
+    <a:masterClrMapping/>
+  </p:clrMapOvr>
+</p:sld>
+</file>
+
+<file path=ppt/slides/slide12.xml><?xml version="1.0" encoding="utf-8"?>
+<p:sld xmlns:a="http://schemas.openxmlformats.org/drawingml/2006/main" xmlns:r="http://schemas.openxmlformats.org/officeDocument/2006/relationships" xmlns:p="http://schemas.openxmlformats.org/presentationml/2006/main">
+  <p:cSld>
+    <p:spTree>
+      <p:nvGrpSpPr>
+        <p:cNvPr id="1" name=""/>
+        <p:cNvGrpSpPr/>
+        <p:nvPr/>
+      </p:nvGrpSpPr>
+      <p:grpSpPr>
+        <a:xfrm>
+          <a:off x="0" y="0"/>
+          <a:ext cx="0" cy="0"/>
+          <a:chOff x="0" y="0"/>
+          <a:chExt cx="0" cy="0"/>
+        </a:xfrm>
+      </p:grpSpPr>
+      <p:sp>
+        <p:nvSpPr>
+          <p:cNvPr id="2" name="Título 1">
+            <a:extLst>
+              <a:ext uri="{FF2B5EF4-FFF2-40B4-BE49-F238E27FC236}">
+                <a16:creationId xmlns:a16="http://schemas.microsoft.com/office/drawing/2014/main" id="{C21CCB2B-073B-473D-B364-EFC541A05DE4}"/>
+              </a:ext>
+            </a:extLst>
+          </p:cNvPr>
+          <p:cNvSpPr>
+            <a:spLocks noGrp="1"/>
+          </p:cNvSpPr>
+          <p:nvPr>
+            <p:ph type="title"/>
+          </p:nvPr>
+        </p:nvSpPr>
+        <p:spPr>
+          <a:xfrm>
+            <a:off x="2475917" y="3429000"/>
+            <a:ext cx="7480300" cy="963613"/>
+          </a:xfrm>
+        </p:spPr>
+        <p:txBody>
+          <a:bodyPr/>
+          <a:lstStyle/>
+          <a:p>
+            <a:pPr algn="ctr"/>
+            <a:r>
+              <a:rPr lang="es-CO" sz="3600" dirty="0"/>
+              <a:t>Gracias</a:t>
+            </a:r>
+          </a:p>
+        </p:txBody>
+      </p:sp>
+    </p:spTree>
+    <p:extLst>
+      <p:ext uri="{BB962C8B-B14F-4D97-AF65-F5344CB8AC3E}">
+        <p14:creationId xmlns:p14="http://schemas.microsoft.com/office/powerpoint/2010/main" val="3285444991"/>
       </p:ext>
     </p:extLst>
   </p:cSld>

</xml_diff>